<commit_message>
New entry to gitignore
</commit_message>
<xml_diff>
--- a/.temp/WS22-23-Software-Engineering-Lektion-02.pptx
+++ b/.temp/WS22-23-Software-Engineering-Lektion-02.pptx
@@ -148,6 +148,9 @@
     <p:ext uri="{EFAFB233-063F-42B5-8137-9DF3F51BA10A}">
       <p15:sldGuideLst xmlns:p15="http://schemas.microsoft.com/office/powerpoint/2012/main"/>
     </p:ext>
+    <p:ext uri="{2D200454-40CA-4A62-9FC3-DE9A4176ACB9}">
+      <p15:notesGuideLst xmlns:p15="http://schemas.microsoft.com/office/powerpoint/2012/main"/>
+    </p:ext>
   </p:extLst>
 </p:presentation>
 </file>
@@ -255,7 +258,7 @@
             <a:fld id="{897F756F-B8E4-4EF8-93FA-2ACCEF5D30FB}" type="datetime1">
               <a:rPr lang="de-DE" altLang="de-DE"/>
               <a:pPr/>
-              <a:t>24.09.2022</a:t>
+              <a:t>25.09.2022</a:t>
             </a:fld>
             <a:endParaRPr lang="de-DE" altLang="de-DE"/>
           </a:p>
@@ -339,7 +342,7 @@
             <a:fld id="{5B42728B-3CFB-4C6F-9C82-206DEE7C5AB7}" type="slidenum">
               <a:rPr lang="de-DE" altLang="de-DE"/>
               <a:pPr/>
-              <a:t>‹Nr.›</a:t>
+              <a:t>‹#›</a:t>
             </a:fld>
             <a:endParaRPr lang="de-DE" altLang="de-DE"/>
           </a:p>
@@ -460,7 +463,7 @@
             <a:fld id="{28525E31-9BC7-4B6E-A68F-BD92C88FDC9D}" type="datetime1">
               <a:rPr lang="de-DE" altLang="de-DE"/>
               <a:pPr/>
-              <a:t>24.09.2022</a:t>
+              <a:t>25.09.2022</a:t>
             </a:fld>
             <a:endParaRPr lang="de-DE" altLang="de-DE"/>
           </a:p>
@@ -641,7 +644,7 @@
             <a:fld id="{9CBAFC69-B15D-43B5-A290-EF34A75D25A5}" type="slidenum">
               <a:rPr lang="de-DE" altLang="de-DE"/>
               <a:pPr/>
-              <a:t>‹Nr.›</a:t>
+              <a:t>‹#›</a:t>
             </a:fld>
             <a:endParaRPr lang="de-DE" altLang="de-DE"/>
           </a:p>
@@ -1334,7 +1337,7 @@
             <a:fld id="{F615B621-9A57-4186-9964-12DDF1747427}" type="slidenum">
               <a:rPr lang="de-DE" altLang="de-DE"/>
               <a:pPr/>
-              <a:t>‹Nr.›</a:t>
+              <a:t>‹#›</a:t>
             </a:fld>
             <a:endParaRPr lang="de-DE" altLang="de-DE"/>
           </a:p>
@@ -1607,14 +1610,14 @@
           </a:ln>
           <a:extLst>
             <a:ext uri="{909E8E84-426E-40dd-AFC4-6F175D3DCCD1}">
-              <a14:hiddenFill xmlns:a14="http://schemas.microsoft.com/office/drawing/2010/main" xmlns="">
+              <a14:hiddenFill xmlns="" xmlns:a14="http://schemas.microsoft.com/office/drawing/2010/main">
                 <a:solidFill>
                   <a:srgbClr val="FFFFFF"/>
                 </a:solidFill>
               </a14:hiddenFill>
             </a:ext>
             <a:ext uri="{91240B29-F687-4f45-9708-019B960494DF}">
-              <a14:hiddenLine xmlns:a14="http://schemas.microsoft.com/office/drawing/2010/main" xmlns="" w="9525">
+              <a14:hiddenLine xmlns="" xmlns:a14="http://schemas.microsoft.com/office/drawing/2010/main" w="9525">
                 <a:solidFill>
                   <a:srgbClr val="000000"/>
                 </a:solidFill>
@@ -2066,7 +2069,7 @@
             <a:fld id="{1ACBEC0B-744E-42FA-8B89-F52FFE0CC167}" type="slidenum">
               <a:rPr lang="de-DE" altLang="de-DE"/>
               <a:pPr/>
-              <a:t>‹Nr.›</a:t>
+              <a:t>‹#›</a:t>
             </a:fld>
             <a:endParaRPr lang="de-DE" altLang="de-DE"/>
           </a:p>
@@ -2339,14 +2342,14 @@
           </a:ln>
           <a:extLst>
             <a:ext uri="{909E8E84-426E-40dd-AFC4-6F175D3DCCD1}">
-              <a14:hiddenFill xmlns:a14="http://schemas.microsoft.com/office/drawing/2010/main" xmlns="">
+              <a14:hiddenFill xmlns="" xmlns:a14="http://schemas.microsoft.com/office/drawing/2010/main">
                 <a:solidFill>
                   <a:srgbClr val="FFFFFF"/>
                 </a:solidFill>
               </a14:hiddenFill>
             </a:ext>
             <a:ext uri="{91240B29-F687-4f45-9708-019B960494DF}">
-              <a14:hiddenLine xmlns:a14="http://schemas.microsoft.com/office/drawing/2010/main" xmlns="" w="9525">
+              <a14:hiddenLine xmlns="" xmlns:a14="http://schemas.microsoft.com/office/drawing/2010/main" w="9525">
                 <a:solidFill>
                   <a:srgbClr val="000000"/>
                 </a:solidFill>
@@ -2608,7 +2611,7 @@
             <a:fld id="{B2ED974F-2696-42E6-B18C-5836B6D97548}" type="slidenum">
               <a:rPr lang="de-DE" altLang="de-DE"/>
               <a:pPr/>
-              <a:t>‹Nr.›</a:t>
+              <a:t>‹#›</a:t>
             </a:fld>
             <a:endParaRPr lang="de-DE" altLang="de-DE"/>
           </a:p>
@@ -2851,14 +2854,14 @@
           </a:ln>
           <a:extLst>
             <a:ext uri="{909E8E84-426E-40dd-AFC4-6F175D3DCCD1}">
-              <a14:hiddenFill xmlns:a14="http://schemas.microsoft.com/office/drawing/2010/main" xmlns="">
+              <a14:hiddenFill xmlns="" xmlns:a14="http://schemas.microsoft.com/office/drawing/2010/main">
                 <a:solidFill>
                   <a:srgbClr val="FFFFFF"/>
                 </a:solidFill>
               </a14:hiddenFill>
             </a:ext>
             <a:ext uri="{91240B29-F687-4f45-9708-019B960494DF}">
-              <a14:hiddenLine xmlns:a14="http://schemas.microsoft.com/office/drawing/2010/main" xmlns="" w="9525">
+              <a14:hiddenLine xmlns="" xmlns:a14="http://schemas.microsoft.com/office/drawing/2010/main" w="9525">
                 <a:solidFill>
                   <a:srgbClr val="000000"/>
                 </a:solidFill>
@@ -3310,7 +3313,7 @@
             <a:fld id="{8F9EB104-BB31-4676-A69B-D2BC3D1EFC76}" type="slidenum">
               <a:rPr lang="de-DE" altLang="de-DE"/>
               <a:pPr/>
-              <a:t>‹Nr.›</a:t>
+              <a:t>‹#›</a:t>
             </a:fld>
             <a:endParaRPr lang="de-DE" altLang="de-DE"/>
           </a:p>
@@ -3553,14 +3556,14 @@
           </a:ln>
           <a:extLst>
             <a:ext uri="{909E8E84-426E-40dd-AFC4-6F175D3DCCD1}">
-              <a14:hiddenFill xmlns:a14="http://schemas.microsoft.com/office/drawing/2010/main" xmlns="">
+              <a14:hiddenFill xmlns="" xmlns:a14="http://schemas.microsoft.com/office/drawing/2010/main">
                 <a:solidFill>
                   <a:srgbClr val="FFFFFF"/>
                 </a:solidFill>
               </a14:hiddenFill>
             </a:ext>
             <a:ext uri="{91240B29-F687-4f45-9708-019B960494DF}">
-              <a14:hiddenLine xmlns:a14="http://schemas.microsoft.com/office/drawing/2010/main" xmlns="" w="9525">
+              <a14:hiddenLine xmlns="" xmlns:a14="http://schemas.microsoft.com/office/drawing/2010/main" w="9525">
                 <a:solidFill>
                   <a:srgbClr val="000000"/>
                 </a:solidFill>
@@ -5053,14 +5056,14 @@
           </a:ln>
           <a:extLst>
             <a:ext uri="{909E8E84-426E-40dd-AFC4-6F175D3DCCD1}">
-              <a14:hiddenFill xmlns:a14="http://schemas.microsoft.com/office/drawing/2010/main" xmlns="">
+              <a14:hiddenFill xmlns="" xmlns:a14="http://schemas.microsoft.com/office/drawing/2010/main">
                 <a:solidFill>
                   <a:srgbClr val="FFFFFF"/>
                 </a:solidFill>
               </a14:hiddenFill>
             </a:ext>
             <a:ext uri="{91240B29-F687-4f45-9708-019B960494DF}">
-              <a14:hiddenLine xmlns:a14="http://schemas.microsoft.com/office/drawing/2010/main" xmlns="" w="9525">
+              <a14:hiddenLine xmlns="" xmlns:a14="http://schemas.microsoft.com/office/drawing/2010/main" w="9525">
                 <a:solidFill>
                   <a:srgbClr val="000000"/>
                 </a:solidFill>
@@ -5509,7 +5512,7 @@
             <a:fld id="{AA258970-1D1F-4745-977D-3DA99F47DD7A}" type="slidenum">
               <a:rPr lang="de-DE" altLang="de-DE"/>
               <a:pPr/>
-              <a:t>‹Nr.›</a:t>
+              <a:t>‹#›</a:t>
             </a:fld>
             <a:endParaRPr lang="de-DE" altLang="de-DE"/>
           </a:p>
@@ -6058,7 +6061,7 @@
             <a:fld id="{54F16082-FC43-4BA7-86F2-04926EE1AC88}" type="slidenum">
               <a:rPr lang="de-DE" altLang="de-DE"/>
               <a:pPr/>
-              <a:t>‹Nr.›</a:t>
+              <a:t>‹#›</a:t>
             </a:fld>
             <a:endParaRPr lang="de-DE" altLang="de-DE"/>
           </a:p>
@@ -6235,14 +6238,14 @@
           </a:ln>
           <a:extLst>
             <a:ext uri="{909E8E84-426E-40dd-AFC4-6F175D3DCCD1}">
-              <a14:hiddenFill xmlns:a14="http://schemas.microsoft.com/office/drawing/2010/main" xmlns="">
+              <a14:hiddenFill xmlns="" xmlns:a14="http://schemas.microsoft.com/office/drawing/2010/main">
                 <a:solidFill>
                   <a:srgbClr val="FFFFFF"/>
                 </a:solidFill>
               </a14:hiddenFill>
             </a:ext>
             <a:ext uri="{91240B29-F687-4f45-9708-019B960494DF}">
-              <a14:hiddenLine xmlns:a14="http://schemas.microsoft.com/office/drawing/2010/main" xmlns="" w="9525">
+              <a14:hiddenLine xmlns="" xmlns:a14="http://schemas.microsoft.com/office/drawing/2010/main" w="9525">
                 <a:solidFill>
                   <a:srgbClr val="000000"/>
                 </a:solidFill>
@@ -6748,7 +6751,7 @@
             <a:fld id="{0B190BD0-AA36-4EEF-9918-435B4FDBCC9F}" type="slidenum">
               <a:rPr lang="de-DE" altLang="de-DE"/>
               <a:pPr/>
-              <a:t>‹Nr.›</a:t>
+              <a:t>‹#›</a:t>
             </a:fld>
             <a:endParaRPr lang="de-DE" altLang="de-DE"/>
           </a:p>
@@ -6925,14 +6928,14 @@
           </a:ln>
           <a:extLst>
             <a:ext uri="{909E8E84-426E-40dd-AFC4-6F175D3DCCD1}">
-              <a14:hiddenFill xmlns:a14="http://schemas.microsoft.com/office/drawing/2010/main" xmlns="">
+              <a14:hiddenFill xmlns="" xmlns:a14="http://schemas.microsoft.com/office/drawing/2010/main">
                 <a:solidFill>
                   <a:srgbClr val="FFFFFF"/>
                 </a:solidFill>
               </a14:hiddenFill>
             </a:ext>
             <a:ext uri="{91240B29-F687-4f45-9708-019B960494DF}">
-              <a14:hiddenLine xmlns:a14="http://schemas.microsoft.com/office/drawing/2010/main" xmlns="" w="9525">
+              <a14:hiddenLine xmlns="" xmlns:a14="http://schemas.microsoft.com/office/drawing/2010/main" w="9525">
                 <a:solidFill>
                   <a:srgbClr val="000000"/>
                 </a:solidFill>
@@ -7470,7 +7473,7 @@
             <a:fld id="{8BA2989F-A84C-446A-8DEA-E2F5AB4C198F}" type="slidenum">
               <a:rPr lang="de-DE" altLang="de-DE"/>
               <a:pPr/>
-              <a:t>‹Nr.›</a:t>
+              <a:t>‹#›</a:t>
             </a:fld>
             <a:endParaRPr lang="de-DE" altLang="de-DE"/>
           </a:p>
@@ -7713,14 +7716,14 @@
           </a:ln>
           <a:extLst>
             <a:ext uri="{909E8E84-426E-40dd-AFC4-6F175D3DCCD1}">
-              <a14:hiddenFill xmlns:a14="http://schemas.microsoft.com/office/drawing/2010/main" xmlns="">
+              <a14:hiddenFill xmlns="" xmlns:a14="http://schemas.microsoft.com/office/drawing/2010/main">
                 <a:solidFill>
                   <a:srgbClr val="FFFFFF"/>
                 </a:solidFill>
               </a14:hiddenFill>
             </a:ext>
             <a:ext uri="{91240B29-F687-4f45-9708-019B960494DF}">
-              <a14:hiddenLine xmlns:a14="http://schemas.microsoft.com/office/drawing/2010/main" xmlns="" w="9525">
+              <a14:hiddenLine xmlns="" xmlns:a14="http://schemas.microsoft.com/office/drawing/2010/main" w="9525">
                 <a:solidFill>
                   <a:srgbClr val="000000"/>
                 </a:solidFill>
@@ -8120,7 +8123,7 @@
             <a:fld id="{88748CFB-16F5-4557-BF75-84AE3C041F21}" type="slidenum">
               <a:rPr lang="de-DE" altLang="de-DE"/>
               <a:pPr/>
-              <a:t>‹Nr.›</a:t>
+              <a:t>‹#›</a:t>
             </a:fld>
             <a:endParaRPr lang="de-DE" altLang="de-DE"/>
           </a:p>
@@ -8363,14 +8366,14 @@
           </a:ln>
           <a:extLst>
             <a:ext uri="{909E8E84-426E-40dd-AFC4-6F175D3DCCD1}">
-              <a14:hiddenFill xmlns:a14="http://schemas.microsoft.com/office/drawing/2010/main" xmlns="">
+              <a14:hiddenFill xmlns="" xmlns:a14="http://schemas.microsoft.com/office/drawing/2010/main">
                 <a:solidFill>
                   <a:srgbClr val="FFFFFF"/>
                 </a:solidFill>
               </a14:hiddenFill>
             </a:ext>
             <a:ext uri="{91240B29-F687-4f45-9708-019B960494DF}">
-              <a14:hiddenLine xmlns:a14="http://schemas.microsoft.com/office/drawing/2010/main" xmlns="" w="9525">
+              <a14:hiddenLine xmlns="" xmlns:a14="http://schemas.microsoft.com/office/drawing/2010/main" w="9525">
                 <a:solidFill>
                   <a:srgbClr val="000000"/>
                 </a:solidFill>
@@ -8706,7 +8709,7 @@
             <a:fld id="{3A2AEAD6-7743-440E-9319-06030D24C279}" type="slidenum">
               <a:rPr lang="de-DE" altLang="de-DE"/>
               <a:pPr/>
-              <a:t>‹Nr.›</a:t>
+              <a:t>‹#›</a:t>
             </a:fld>
             <a:endParaRPr lang="de-DE" altLang="de-DE"/>
           </a:p>
@@ -8979,14 +8982,14 @@
           </a:ln>
           <a:extLst>
             <a:ext uri="{909E8E84-426E-40dd-AFC4-6F175D3DCCD1}">
-              <a14:hiddenFill xmlns:a14="http://schemas.microsoft.com/office/drawing/2010/main" xmlns="">
+              <a14:hiddenFill xmlns="" xmlns:a14="http://schemas.microsoft.com/office/drawing/2010/main">
                 <a:solidFill>
                   <a:srgbClr val="FFFFFF"/>
                 </a:solidFill>
               </a14:hiddenFill>
             </a:ext>
             <a:ext uri="{91240B29-F687-4f45-9708-019B960494DF}">
-              <a14:hiddenLine xmlns:a14="http://schemas.microsoft.com/office/drawing/2010/main" xmlns="" w="9525">
+              <a14:hiddenLine xmlns="" xmlns:a14="http://schemas.microsoft.com/office/drawing/2010/main" w="9525">
                 <a:solidFill>
                   <a:srgbClr val="000000"/>
                 </a:solidFill>
@@ -9322,7 +9325,7 @@
             <a:fld id="{57A9147C-CE30-4024-B815-E68A62F18E6D}" type="slidenum">
               <a:rPr lang="de-DE" altLang="de-DE"/>
               <a:pPr/>
-              <a:t>‹Nr.›</a:t>
+              <a:t>‹#›</a:t>
             </a:fld>
             <a:endParaRPr lang="de-DE" altLang="de-DE"/>
           </a:p>
@@ -9595,14 +9598,14 @@
           </a:ln>
           <a:extLst>
             <a:ext uri="{909E8E84-426E-40dd-AFC4-6F175D3DCCD1}">
-              <a14:hiddenFill xmlns:a14="http://schemas.microsoft.com/office/drawing/2010/main" xmlns="">
+              <a14:hiddenFill xmlns="" xmlns:a14="http://schemas.microsoft.com/office/drawing/2010/main">
                 <a:solidFill>
                   <a:srgbClr val="FFFFFF"/>
                 </a:solidFill>
               </a14:hiddenFill>
             </a:ext>
             <a:ext uri="{91240B29-F687-4f45-9708-019B960494DF}">
-              <a14:hiddenLine xmlns:a14="http://schemas.microsoft.com/office/drawing/2010/main" xmlns="" w="9525">
+              <a14:hiddenLine xmlns="" xmlns:a14="http://schemas.microsoft.com/office/drawing/2010/main" w="9525">
                 <a:solidFill>
                   <a:srgbClr val="000000"/>
                 </a:solidFill>
@@ -9818,7 +9821,7 @@
             <a:fld id="{4510605E-EB86-4706-A13D-B44010380F2A}" type="slidenum">
               <a:rPr lang="de-DE" altLang="de-DE"/>
               <a:pPr/>
-              <a:t>‹Nr.›</a:t>
+              <a:t>‹#›</a:t>
             </a:fld>
             <a:endParaRPr lang="de-DE" altLang="de-DE"/>
           </a:p>
@@ -10772,7 +10775,10 @@
           <a:bodyPr/>
           <a:lstStyle/>
           <a:p>
-            <a:endParaRPr lang="de-DE"/>
+            <a:r>
+              <a:rPr lang="de-DE" dirty="0"/>
+              <a:t> Warum ist Dokumentation wichtig?</a:t>
+            </a:r>
           </a:p>
         </p:txBody>
       </p:sp>

</xml_diff>